<commit_message>
update f2f closing pres
add action to add resources and contact information to presentation template
</commit_message>
<xml_diff>
--- a/PRESENTATIONS/2020-06-online-f2f/2020-06-26-Closing-McCool.pptx
+++ b/PRESENTATIONS/2020-06-online-f2f/2020-06-26-Closing-McCool.pptx
@@ -4826,6 +4826,21 @@
                 <a:sym typeface="Wingdings" pitchFamily="2" charset="2"/>
               </a:rPr>
               <a:t>API Specification conference  abstract, slides review</a:t>
+            </a:r>
+          </a:p>
+          <a:p>
+            <a:pPr lvl="1"/>
+            <a:r>
+              <a:rPr lang="en-US" dirty="0">
+                <a:sym typeface="Wingdings" pitchFamily="2" charset="2"/>
+              </a:rPr>
+              <a:t>Pres template – add resources, </a:t>
+            </a:r>
+            <a:r>
+              <a:rPr lang="en-US">
+                <a:sym typeface="Wingdings" pitchFamily="2" charset="2"/>
+              </a:rPr>
+              <a:t>contact slides</a:t>
             </a:r>
             <a:endParaRPr lang="en-US" dirty="0"/>
           </a:p>

</xml_diff>